<commit_message>
combining final presentations for submission
</commit_message>
<xml_diff>
--- a/Presentations/ProjectPresentation_04-27-CB.pptx
+++ b/Presentations/ProjectPresentation_04-27-CB.pptx
@@ -291,7 +291,7 @@
           <a:p>
             <a:fld id="{CD63FF02-0E8F-C94D-9333-E7E525B6484A}" type="datetimeFigureOut">
               <a:rPr lang="en-US" smtClean="0"/>
-              <a:t>4/27/21</a:t>
+              <a:t>4/27/2021</a:t>
             </a:fld>
             <a:endParaRPr lang="en-US"/>
           </a:p>
@@ -489,7 +489,7 @@
           <a:p>
             <a:fld id="{CD63FF02-0E8F-C94D-9333-E7E525B6484A}" type="datetimeFigureOut">
               <a:rPr lang="en-US" smtClean="0"/>
-              <a:t>4/27/21</a:t>
+              <a:t>4/27/2021</a:t>
             </a:fld>
             <a:endParaRPr lang="en-US"/>
           </a:p>
@@ -697,7 +697,7 @@
           <a:p>
             <a:fld id="{CD63FF02-0E8F-C94D-9333-E7E525B6484A}" type="datetimeFigureOut">
               <a:rPr lang="en-US" smtClean="0"/>
-              <a:t>4/27/21</a:t>
+              <a:t>4/27/2021</a:t>
             </a:fld>
             <a:endParaRPr lang="en-US"/>
           </a:p>
@@ -900,7 +900,7 @@
           <a:p>
             <a:fld id="{CD63FF02-0E8F-C94D-9333-E7E525B6484A}" type="datetimeFigureOut">
               <a:rPr lang="en-US" smtClean="0"/>
-              <a:t>4/27/21</a:t>
+              <a:t>4/27/2021</a:t>
             </a:fld>
             <a:endParaRPr lang="en-US"/>
           </a:p>
@@ -1175,7 +1175,7 @@
           <a:p>
             <a:fld id="{CD63FF02-0E8F-C94D-9333-E7E525B6484A}" type="datetimeFigureOut">
               <a:rPr lang="en-US" smtClean="0"/>
-              <a:t>4/27/21</a:t>
+              <a:t>4/27/2021</a:t>
             </a:fld>
             <a:endParaRPr lang="en-US"/>
           </a:p>
@@ -1440,7 +1440,7 @@
           <a:p>
             <a:fld id="{CD63FF02-0E8F-C94D-9333-E7E525B6484A}" type="datetimeFigureOut">
               <a:rPr lang="en-US" smtClean="0"/>
-              <a:t>4/27/21</a:t>
+              <a:t>4/27/2021</a:t>
             </a:fld>
             <a:endParaRPr lang="en-US"/>
           </a:p>
@@ -1852,7 +1852,7 @@
           <a:p>
             <a:fld id="{CD63FF02-0E8F-C94D-9333-E7E525B6484A}" type="datetimeFigureOut">
               <a:rPr lang="en-US" smtClean="0"/>
-              <a:t>4/27/21</a:t>
+              <a:t>4/27/2021</a:t>
             </a:fld>
             <a:endParaRPr lang="en-US"/>
           </a:p>
@@ -1993,7 +1993,7 @@
           <a:p>
             <a:fld id="{CD63FF02-0E8F-C94D-9333-E7E525B6484A}" type="datetimeFigureOut">
               <a:rPr lang="en-US" smtClean="0"/>
-              <a:t>4/27/21</a:t>
+              <a:t>4/27/2021</a:t>
             </a:fld>
             <a:endParaRPr lang="en-US"/>
           </a:p>
@@ -2106,7 +2106,7 @@
           <a:p>
             <a:fld id="{CD63FF02-0E8F-C94D-9333-E7E525B6484A}" type="datetimeFigureOut">
               <a:rPr lang="en-US" smtClean="0"/>
-              <a:t>4/27/21</a:t>
+              <a:t>4/27/2021</a:t>
             </a:fld>
             <a:endParaRPr lang="en-US"/>
           </a:p>
@@ -2417,7 +2417,7 @@
           <a:p>
             <a:fld id="{CD63FF02-0E8F-C94D-9333-E7E525B6484A}" type="datetimeFigureOut">
               <a:rPr lang="en-US" smtClean="0"/>
-              <a:t>4/27/21</a:t>
+              <a:t>4/27/2021</a:t>
             </a:fld>
             <a:endParaRPr lang="en-US"/>
           </a:p>
@@ -2705,7 +2705,7 @@
           <a:p>
             <a:fld id="{CD63FF02-0E8F-C94D-9333-E7E525B6484A}" type="datetimeFigureOut">
               <a:rPr lang="en-US" smtClean="0"/>
-              <a:t>4/27/21</a:t>
+              <a:t>4/27/2021</a:t>
             </a:fld>
             <a:endParaRPr lang="en-US"/>
           </a:p>
@@ -2955,7 +2955,7 @@
           <a:p>
             <a:fld id="{CD63FF02-0E8F-C94D-9333-E7E525B6484A}" type="datetimeFigureOut">
               <a:rPr lang="en-US" smtClean="0"/>
-              <a:t>4/27/21</a:t>
+              <a:t>4/27/2021</a:t>
             </a:fld>
             <a:endParaRPr lang="en-US"/>
           </a:p>
@@ -3500,13 +3500,18 @@
           </a:p>
           <a:p>
             <a:r>
-              <a:rPr lang="en-US" dirty="0">
+              <a:rPr lang="en-US">
                 <a:solidFill>
                   <a:schemeClr val="accent3"/>
                 </a:solidFill>
               </a:rPr>
-              <a:t>04/15/2021</a:t>
-            </a:r>
+              <a:t>04/27/2021</a:t>
+            </a:r>
+            <a:endParaRPr lang="en-US" dirty="0">
+              <a:solidFill>
+                <a:schemeClr val="accent3"/>
+              </a:solidFill>
+            </a:endParaRPr>
           </a:p>
         </p:txBody>
       </p:sp>
@@ -4524,8 +4529,8 @@
           </a:p>
         </p:txBody>
       </p:sp>
-      <mc:AlternateContent xmlns:mc="http://schemas.openxmlformats.org/markup-compatibility/2006">
-        <mc:Choice xmlns:a14="http://schemas.microsoft.com/office/drawing/2010/main" Requires="a14">
+      <mc:AlternateContent xmlns:mc="http://schemas.openxmlformats.org/markup-compatibility/2006" xmlns:a14="http://schemas.microsoft.com/office/drawing/2010/main">
+        <mc:Choice Requires="a14">
           <p:sp>
             <p:nvSpPr>
               <p:cNvPr id="7" name="TextBox 6">
@@ -4554,6 +4559,7 @@
               </a:bodyPr>
               <a:lstStyle/>
               <a:p>
+                <a:pPr/>
                 <a14:m>
                   <m:oMathPara xmlns:m="http://schemas.openxmlformats.org/officeDocument/2006/math">
                     <m:oMathParaPr>
@@ -4667,7 +4673,7 @@
             </p:txBody>
           </p:sp>
         </mc:Choice>
-        <mc:Fallback>
+        <mc:Fallback xmlns="">
           <p:sp>
             <p:nvSpPr>
               <p:cNvPr id="7" name="TextBox 6">
@@ -8782,8 +8788,8 @@
           </p:txBody>
         </p:sp>
       </p:grpSp>
-      <mc:AlternateContent xmlns:mc="http://schemas.openxmlformats.org/markup-compatibility/2006">
-        <mc:Choice xmlns:a14="http://schemas.microsoft.com/office/drawing/2010/main" Requires="a14">
+      <mc:AlternateContent xmlns:mc="http://schemas.openxmlformats.org/markup-compatibility/2006" xmlns:a14="http://schemas.microsoft.com/office/drawing/2010/main">
+        <mc:Choice Requires="a14">
           <p:sp>
             <p:nvSpPr>
               <p:cNvPr id="7" name="TextBox 6">
@@ -8978,7 +8984,7 @@
             </p:txBody>
           </p:sp>
         </mc:Choice>
-        <mc:Fallback>
+        <mc:Fallback xmlns="">
           <p:sp>
             <p:nvSpPr>
               <p:cNvPr id="7" name="TextBox 6">

</xml_diff>